<commit_message>
Zvucna simulacija u prezentaciji
</commit_message>
<xml_diff>
--- a/Dokumentacija/Prezentacija.pptx
+++ b/Dokumentacija/Prezentacija.pptx
@@ -14,6 +14,10 @@
     <p:sldId id="261" r:id="rId8"/>
     <p:sldId id="262" r:id="rId9"/>
     <p:sldId id="263" r:id="rId10"/>
+    <p:sldId id="265" r:id="rId11"/>
+    <p:sldId id="266" r:id="rId12"/>
+    <p:sldId id="267" r:id="rId13"/>
+    <p:sldId id="268" r:id="rId14"/>
   </p:sldIdLst>
   <p:sldSz cx="9144000" cy="6858000" type="screen4x3"/>
   <p:notesSz cx="6858000" cy="9144000"/>
@@ -308,7 +312,7 @@
             <a:fld id="{1D8BD707-D9CF-40AE-B4C6-C98DA3205C09}" type="datetimeFigureOut">
               <a:rPr lang="en-US" smtClean="0"/>
               <a:pPr/>
-              <a:t>1/7/2015</a:t>
+              <a:t>1/8/2015</a:t>
             </a:fld>
             <a:endParaRPr lang="en-US"/>
           </a:p>
@@ -475,7 +479,7 @@
             <a:fld id="{1D8BD707-D9CF-40AE-B4C6-C98DA3205C09}" type="datetimeFigureOut">
               <a:rPr lang="en-US" smtClean="0"/>
               <a:pPr/>
-              <a:t>1/7/2015</a:t>
+              <a:t>1/8/2015</a:t>
             </a:fld>
             <a:endParaRPr lang="en-US"/>
           </a:p>
@@ -652,7 +656,7 @@
             <a:fld id="{1D8BD707-D9CF-40AE-B4C6-C98DA3205C09}" type="datetimeFigureOut">
               <a:rPr lang="en-US" smtClean="0"/>
               <a:pPr/>
-              <a:t>1/7/2015</a:t>
+              <a:t>1/8/2015</a:t>
             </a:fld>
             <a:endParaRPr lang="en-US"/>
           </a:p>
@@ -837,7 +841,7 @@
             <a:fld id="{1D8BD707-D9CF-40AE-B4C6-C98DA3205C09}" type="datetimeFigureOut">
               <a:rPr lang="en-US" smtClean="0"/>
               <a:pPr/>
-              <a:t>1/7/2015</a:t>
+              <a:t>1/8/2015</a:t>
             </a:fld>
             <a:endParaRPr lang="en-US"/>
           </a:p>
@@ -1101,7 +1105,7 @@
             <a:fld id="{1D8BD707-D9CF-40AE-B4C6-C98DA3205C09}" type="datetimeFigureOut">
               <a:rPr lang="en-US" smtClean="0"/>
               <a:pPr/>
-              <a:t>1/7/2015</a:t>
+              <a:t>1/8/2015</a:t>
             </a:fld>
             <a:endParaRPr lang="en-US"/>
           </a:p>
@@ -1451,7 +1455,7 @@
             <a:fld id="{1D8BD707-D9CF-40AE-B4C6-C98DA3205C09}" type="datetimeFigureOut">
               <a:rPr lang="en-US" smtClean="0"/>
               <a:pPr/>
-              <a:t>1/7/2015</a:t>
+              <a:t>1/8/2015</a:t>
             </a:fld>
             <a:endParaRPr lang="en-US"/>
           </a:p>
@@ -1761,7 +1765,7 @@
             <a:fld id="{1D8BD707-D9CF-40AE-B4C6-C98DA3205C09}" type="datetimeFigureOut">
               <a:rPr lang="en-US" smtClean="0"/>
               <a:pPr/>
-              <a:t>1/7/2015</a:t>
+              <a:t>1/8/2015</a:t>
             </a:fld>
             <a:endParaRPr lang="en-US"/>
           </a:p>
@@ -1990,7 +1994,7 @@
             <a:fld id="{1D8BD707-D9CF-40AE-B4C6-C98DA3205C09}" type="datetimeFigureOut">
               <a:rPr lang="en-US" smtClean="0"/>
               <a:pPr/>
-              <a:t>1/7/2015</a:t>
+              <a:t>1/8/2015</a:t>
             </a:fld>
             <a:endParaRPr lang="en-US"/>
           </a:p>
@@ -2082,7 +2086,7 @@
             <a:fld id="{1D8BD707-D9CF-40AE-B4C6-C98DA3205C09}" type="datetimeFigureOut">
               <a:rPr lang="en-US" smtClean="0"/>
               <a:pPr/>
-              <a:t>1/7/2015</a:t>
+              <a:t>1/8/2015</a:t>
             </a:fld>
             <a:endParaRPr lang="en-US"/>
           </a:p>
@@ -2372,7 +2376,7 @@
             <a:fld id="{1D8BD707-D9CF-40AE-B4C6-C98DA3205C09}" type="datetimeFigureOut">
               <a:rPr lang="en-US" smtClean="0"/>
               <a:pPr/>
-              <a:t>1/7/2015</a:t>
+              <a:t>1/8/2015</a:t>
             </a:fld>
             <a:endParaRPr lang="en-US"/>
           </a:p>
@@ -2643,7 +2647,7 @@
             <a:fld id="{1D8BD707-D9CF-40AE-B4C6-C98DA3205C09}" type="datetimeFigureOut">
               <a:rPr lang="en-US" smtClean="0"/>
               <a:pPr/>
-              <a:t>1/7/2015</a:t>
+              <a:t>1/8/2015</a:t>
             </a:fld>
             <a:endParaRPr lang="en-US"/>
           </a:p>
@@ -2855,7 +2859,7 @@
             <a:fld id="{1D8BD707-D9CF-40AE-B4C6-C98DA3205C09}" type="datetimeFigureOut">
               <a:rPr lang="en-US" smtClean="0"/>
               <a:pPr/>
-              <a:t>1/7/2015</a:t>
+              <a:t>1/8/2015</a:t>
             </a:fld>
             <a:endParaRPr lang="en-US"/>
           </a:p>
@@ -3431,6 +3435,513 @@
     <p:extLst>
       <p:ext uri="{BB962C8B-B14F-4D97-AF65-F5344CB8AC3E}">
         <p14:creationId xmlns:p14="http://schemas.microsoft.com/office/powerpoint/2010/main" val="1198688332"/>
+      </p:ext>
+    </p:extLst>
+  </p:cSld>
+  <p:clrMapOvr>
+    <a:masterClrMapping/>
+  </p:clrMapOvr>
+  <p:timing>
+    <p:tnLst>
+      <p:par>
+        <p:cTn id="1" dur="indefinite" restart="never" nodeType="tmRoot"/>
+      </p:par>
+    </p:tnLst>
+  </p:timing>
+</p:sld>
+</file>
+
+<file path=ppt/slides/slide10.xml><?xml version="1.0" encoding="utf-8"?>
+<p:sld xmlns:a="http://schemas.openxmlformats.org/drawingml/2006/main" xmlns:r="http://schemas.openxmlformats.org/officeDocument/2006/relationships" xmlns:p="http://schemas.openxmlformats.org/presentationml/2006/main">
+  <p:cSld>
+    <p:spTree>
+      <p:nvGrpSpPr>
+        <p:cNvPr id="1" name=""/>
+        <p:cNvGrpSpPr/>
+        <p:nvPr/>
+      </p:nvGrpSpPr>
+      <p:grpSpPr>
+        <a:xfrm>
+          <a:off x="0" y="0"/>
+          <a:ext cx="0" cy="0"/>
+          <a:chOff x="0" y="0"/>
+          <a:chExt cx="0" cy="0"/>
+        </a:xfrm>
+      </p:grpSpPr>
+      <p:sp>
+        <p:nvSpPr>
+          <p:cNvPr id="4" name="Title 3"/>
+          <p:cNvSpPr>
+            <a:spLocks noGrp="1"/>
+          </p:cNvSpPr>
+          <p:nvPr>
+            <p:ph type="title"/>
+          </p:nvPr>
+        </p:nvSpPr>
+        <p:spPr/>
+        <p:txBody>
+          <a:bodyPr/>
+          <a:lstStyle/>
+          <a:p>
+            <a:r>
+              <a:rPr lang="hr-HR" dirty="0" smtClean="0"/>
+              <a:t>Zvučna simulacija</a:t>
+            </a:r>
+            <a:endParaRPr lang="hr-HR" dirty="0"/>
+          </a:p>
+        </p:txBody>
+      </p:sp>
+      <p:sp>
+        <p:nvSpPr>
+          <p:cNvPr id="5" name="Text Placeholder 4"/>
+          <p:cNvSpPr>
+            <a:spLocks noGrp="1"/>
+          </p:cNvSpPr>
+          <p:nvPr>
+            <p:ph type="body" idx="1"/>
+          </p:nvPr>
+        </p:nvSpPr>
+        <p:spPr/>
+        <p:txBody>
+          <a:bodyPr/>
+          <a:lstStyle/>
+          <a:p>
+            <a:endParaRPr lang="hr-HR" dirty="0"/>
+          </a:p>
+        </p:txBody>
+      </p:sp>
+    </p:spTree>
+    <p:extLst>
+      <p:ext uri="{BB962C8B-B14F-4D97-AF65-F5344CB8AC3E}">
+        <p14:creationId xmlns:p14="http://schemas.microsoft.com/office/powerpoint/2010/main" val="2267565220"/>
+      </p:ext>
+    </p:extLst>
+  </p:cSld>
+  <p:clrMapOvr>
+    <a:masterClrMapping/>
+  </p:clrMapOvr>
+  <p:timing>
+    <p:tnLst>
+      <p:par>
+        <p:cTn id="1" dur="indefinite" restart="never" nodeType="tmRoot"/>
+      </p:par>
+    </p:tnLst>
+  </p:timing>
+</p:sld>
+</file>
+
+<file path=ppt/slides/slide11.xml><?xml version="1.0" encoding="utf-8"?>
+<p:sld xmlns:a="http://schemas.openxmlformats.org/drawingml/2006/main" xmlns:r="http://schemas.openxmlformats.org/officeDocument/2006/relationships" xmlns:p="http://schemas.openxmlformats.org/presentationml/2006/main">
+  <p:cSld>
+    <p:spTree>
+      <p:nvGrpSpPr>
+        <p:cNvPr id="1" name=""/>
+        <p:cNvGrpSpPr/>
+        <p:nvPr/>
+      </p:nvGrpSpPr>
+      <p:grpSpPr>
+        <a:xfrm>
+          <a:off x="0" y="0"/>
+          <a:ext cx="0" cy="0"/>
+          <a:chOff x="0" y="0"/>
+          <a:chExt cx="0" cy="0"/>
+        </a:xfrm>
+      </p:grpSpPr>
+      <p:sp>
+        <p:nvSpPr>
+          <p:cNvPr id="2" name="Title 1"/>
+          <p:cNvSpPr>
+            <a:spLocks noGrp="1"/>
+          </p:cNvSpPr>
+          <p:nvPr>
+            <p:ph type="title"/>
+          </p:nvPr>
+        </p:nvSpPr>
+        <p:spPr/>
+        <p:txBody>
+          <a:bodyPr/>
+          <a:lstStyle/>
+          <a:p>
+            <a:r>
+              <a:rPr lang="hr-HR" dirty="0" smtClean="0"/>
+              <a:t>Izvori zvukova</a:t>
+            </a:r>
+            <a:endParaRPr lang="hr-HR" dirty="0"/>
+          </a:p>
+        </p:txBody>
+      </p:sp>
+      <p:sp>
+        <p:nvSpPr>
+          <p:cNvPr id="3" name="Content Placeholder 2"/>
+          <p:cNvSpPr>
+            <a:spLocks noGrp="1"/>
+          </p:cNvSpPr>
+          <p:nvPr>
+            <p:ph idx="1"/>
+          </p:nvPr>
+        </p:nvSpPr>
+        <p:spPr/>
+        <p:txBody>
+          <a:bodyPr/>
+          <a:lstStyle/>
+          <a:p>
+            <a:r>
+              <a:rPr lang="hr-HR" dirty="0" smtClean="0"/>
+              <a:t>Učitavanje iz zvučnih datoteka</a:t>
+            </a:r>
+          </a:p>
+          <a:p>
+            <a:pPr lvl="1"/>
+            <a:r>
+              <a:rPr lang="hr-HR" dirty="0" smtClean="0"/>
+              <a:t>U RAM ili direktna reprodukcija sa tvrdog diska</a:t>
+            </a:r>
+          </a:p>
+          <a:p>
+            <a:pPr lvl="1"/>
+            <a:endParaRPr lang="hr-HR" dirty="0" smtClean="0"/>
+          </a:p>
+          <a:p>
+            <a:r>
+              <a:rPr lang="hr-HR" dirty="0" smtClean="0"/>
+              <a:t>Postavljanje pozicije</a:t>
+            </a:r>
+          </a:p>
+          <a:p>
+            <a:pPr lvl="1"/>
+            <a:r>
+              <a:rPr lang="hr-HR" dirty="0" smtClean="0"/>
+              <a:t>Preko 3D vektora</a:t>
+            </a:r>
+          </a:p>
+          <a:p>
+            <a:pPr lvl="1"/>
+            <a:endParaRPr lang="hr-HR" dirty="0"/>
+          </a:p>
+          <a:p>
+            <a:pPr lvl="1"/>
+            <a:endParaRPr lang="hr-HR" dirty="0"/>
+          </a:p>
+        </p:txBody>
+      </p:sp>
+      <p:pic>
+        <p:nvPicPr>
+          <p:cNvPr id="4" name="Picture 3"/>
+          <p:cNvPicPr>
+            <a:picLocks noChangeAspect="1"/>
+          </p:cNvPicPr>
+          <p:nvPr/>
+        </p:nvPicPr>
+        <p:blipFill>
+          <a:blip r:embed="rId2">
+            <a:extLst>
+              <a:ext uri="{28A0092B-C50C-407E-A947-70E740481C1C}">
+                <a14:useLocalDpi xmlns:a14="http://schemas.microsoft.com/office/drawing/2010/main" val="0"/>
+              </a:ext>
+            </a:extLst>
+          </a:blip>
+          <a:stretch>
+            <a:fillRect/>
+          </a:stretch>
+        </p:blipFill>
+        <p:spPr>
+          <a:xfrm>
+            <a:off x="768607" y="3657600"/>
+            <a:ext cx="7606786" cy="2448000"/>
+          </a:xfrm>
+          <a:prstGeom prst="rect">
+            <a:avLst/>
+          </a:prstGeom>
+        </p:spPr>
+      </p:pic>
+    </p:spTree>
+    <p:extLst>
+      <p:ext uri="{BB962C8B-B14F-4D97-AF65-F5344CB8AC3E}">
+        <p14:creationId xmlns:p14="http://schemas.microsoft.com/office/powerpoint/2010/main" val="3019331709"/>
+      </p:ext>
+    </p:extLst>
+  </p:cSld>
+  <p:clrMapOvr>
+    <a:masterClrMapping/>
+  </p:clrMapOvr>
+  <p:timing>
+    <p:tnLst>
+      <p:par>
+        <p:cTn id="1" dur="indefinite" restart="never" nodeType="tmRoot"/>
+      </p:par>
+    </p:tnLst>
+  </p:timing>
+</p:sld>
+</file>
+
+<file path=ppt/slides/slide12.xml><?xml version="1.0" encoding="utf-8"?>
+<p:sld xmlns:a="http://schemas.openxmlformats.org/drawingml/2006/main" xmlns:r="http://schemas.openxmlformats.org/officeDocument/2006/relationships" xmlns:p="http://schemas.openxmlformats.org/presentationml/2006/main">
+  <p:cSld>
+    <p:spTree>
+      <p:nvGrpSpPr>
+        <p:cNvPr id="1" name=""/>
+        <p:cNvGrpSpPr/>
+        <p:nvPr/>
+      </p:nvGrpSpPr>
+      <p:grpSpPr>
+        <a:xfrm>
+          <a:off x="0" y="0"/>
+          <a:ext cx="0" cy="0"/>
+          <a:chOff x="0" y="0"/>
+          <a:chExt cx="0" cy="0"/>
+        </a:xfrm>
+      </p:grpSpPr>
+      <p:sp>
+        <p:nvSpPr>
+          <p:cNvPr id="2" name="Title 1"/>
+          <p:cNvSpPr>
+            <a:spLocks noGrp="1"/>
+          </p:cNvSpPr>
+          <p:nvPr>
+            <p:ph type="title"/>
+          </p:nvPr>
+        </p:nvSpPr>
+        <p:spPr/>
+        <p:txBody>
+          <a:bodyPr/>
+          <a:lstStyle/>
+          <a:p>
+            <a:r>
+              <a:rPr lang="hr-HR" dirty="0"/>
+              <a:t>S</a:t>
+            </a:r>
+            <a:r>
+              <a:rPr lang="hr-HR" dirty="0" smtClean="0"/>
+              <a:t>lušatelj</a:t>
+            </a:r>
+            <a:endParaRPr lang="hr-HR" dirty="0"/>
+          </a:p>
+        </p:txBody>
+      </p:sp>
+      <p:sp>
+        <p:nvSpPr>
+          <p:cNvPr id="3" name="Content Placeholder 2"/>
+          <p:cNvSpPr>
+            <a:spLocks noGrp="1"/>
+          </p:cNvSpPr>
+          <p:nvPr>
+            <p:ph idx="1"/>
+          </p:nvPr>
+        </p:nvSpPr>
+        <p:spPr/>
+        <p:txBody>
+          <a:bodyPr/>
+          <a:lstStyle/>
+          <a:p>
+            <a:r>
+              <a:rPr lang="hr-HR" dirty="0"/>
+              <a:t>Postavljanje </a:t>
+            </a:r>
+            <a:r>
+              <a:rPr lang="hr-HR" dirty="0" smtClean="0"/>
+              <a:t>pozicije</a:t>
+            </a:r>
+            <a:r>
+              <a:rPr lang="hr-HR" dirty="0"/>
+              <a:t> </a:t>
+            </a:r>
+            <a:r>
+              <a:rPr lang="hr-HR" dirty="0" smtClean="0"/>
+              <a:t>i orijentacije</a:t>
+            </a:r>
+          </a:p>
+          <a:p>
+            <a:pPr lvl="1"/>
+            <a:r>
+              <a:rPr lang="hr-HR" dirty="0" smtClean="0"/>
+              <a:t>Pozicija preko 3D vektora</a:t>
+            </a:r>
+          </a:p>
+          <a:p>
+            <a:pPr lvl="1"/>
+            <a:r>
+              <a:rPr lang="hr-HR" dirty="0" smtClean="0"/>
+              <a:t>Orijentacija preko tri vektora</a:t>
+            </a:r>
+          </a:p>
+          <a:p>
+            <a:pPr lvl="1"/>
+            <a:endParaRPr lang="hr-HR" dirty="0" smtClean="0"/>
+          </a:p>
+          <a:p>
+            <a:r>
+              <a:rPr lang="hr-HR" dirty="0" smtClean="0"/>
+              <a:t>Položaj i orijentacija istovjetni s onima od kamere</a:t>
+            </a:r>
+            <a:endParaRPr lang="hr-HR" dirty="0"/>
+          </a:p>
+          <a:p>
+            <a:endParaRPr lang="hr-HR" dirty="0" smtClean="0"/>
+          </a:p>
+        </p:txBody>
+      </p:sp>
+      <p:pic>
+        <p:nvPicPr>
+          <p:cNvPr id="4" name="Picture 3"/>
+          <p:cNvPicPr>
+            <a:picLocks noChangeAspect="1"/>
+          </p:cNvPicPr>
+          <p:nvPr/>
+        </p:nvPicPr>
+        <p:blipFill>
+          <a:blip r:embed="rId2">
+            <a:extLst>
+              <a:ext uri="{28A0092B-C50C-407E-A947-70E740481C1C}">
+                <a14:useLocalDpi xmlns:a14="http://schemas.microsoft.com/office/drawing/2010/main" val="0"/>
+              </a:ext>
+            </a:extLst>
+          </a:blip>
+          <a:stretch>
+            <a:fillRect/>
+          </a:stretch>
+        </p:blipFill>
+        <p:spPr>
+          <a:xfrm>
+            <a:off x="2986088" y="3657600"/>
+            <a:ext cx="3171825" cy="2219325"/>
+          </a:xfrm>
+          <a:prstGeom prst="rect">
+            <a:avLst/>
+          </a:prstGeom>
+        </p:spPr>
+      </p:pic>
+    </p:spTree>
+    <p:extLst>
+      <p:ext uri="{BB962C8B-B14F-4D97-AF65-F5344CB8AC3E}">
+        <p14:creationId xmlns:p14="http://schemas.microsoft.com/office/powerpoint/2010/main" val="561081063"/>
+      </p:ext>
+    </p:extLst>
+  </p:cSld>
+  <p:clrMapOvr>
+    <a:masterClrMapping/>
+  </p:clrMapOvr>
+  <p:timing>
+    <p:tnLst>
+      <p:par>
+        <p:cTn id="1" dur="indefinite" restart="never" nodeType="tmRoot"/>
+      </p:par>
+    </p:tnLst>
+  </p:timing>
+</p:sld>
+</file>
+
+<file path=ppt/slides/slide13.xml><?xml version="1.0" encoding="utf-8"?>
+<p:sld xmlns:a="http://schemas.openxmlformats.org/drawingml/2006/main" xmlns:r="http://schemas.openxmlformats.org/officeDocument/2006/relationships" xmlns:p="http://schemas.openxmlformats.org/presentationml/2006/main">
+  <p:cSld>
+    <p:spTree>
+      <p:nvGrpSpPr>
+        <p:cNvPr id="1" name=""/>
+        <p:cNvGrpSpPr/>
+        <p:nvPr/>
+      </p:nvGrpSpPr>
+      <p:grpSpPr>
+        <a:xfrm>
+          <a:off x="0" y="0"/>
+          <a:ext cx="0" cy="0"/>
+          <a:chOff x="0" y="0"/>
+          <a:chExt cx="0" cy="0"/>
+        </a:xfrm>
+      </p:grpSpPr>
+      <p:sp>
+        <p:nvSpPr>
+          <p:cNvPr id="2" name="Title 1"/>
+          <p:cNvSpPr>
+            <a:spLocks noGrp="1"/>
+          </p:cNvSpPr>
+          <p:nvPr>
+            <p:ph type="title"/>
+          </p:nvPr>
+        </p:nvSpPr>
+        <p:spPr/>
+        <p:txBody>
+          <a:bodyPr/>
+          <a:lstStyle/>
+          <a:p>
+            <a:r>
+              <a:rPr lang="hr-HR" dirty="0" smtClean="0"/>
+              <a:t>Zvukovi u projektu</a:t>
+            </a:r>
+            <a:endParaRPr lang="hr-HR" dirty="0"/>
+          </a:p>
+        </p:txBody>
+      </p:sp>
+      <p:sp>
+        <p:nvSpPr>
+          <p:cNvPr id="3" name="Content Placeholder 2"/>
+          <p:cNvSpPr>
+            <a:spLocks noGrp="1"/>
+          </p:cNvSpPr>
+          <p:nvPr>
+            <p:ph idx="1"/>
+          </p:nvPr>
+        </p:nvSpPr>
+        <p:spPr/>
+        <p:txBody>
+          <a:bodyPr>
+            <a:normAutofit/>
+          </a:bodyPr>
+          <a:lstStyle/>
+          <a:p>
+            <a:r>
+              <a:rPr lang="hr-HR" dirty="0" smtClean="0"/>
+              <a:t>Zvuk rada motora</a:t>
+            </a:r>
+          </a:p>
+          <a:p>
+            <a:pPr lvl="1"/>
+            <a:r>
+              <a:rPr lang="hr-HR" dirty="0" smtClean="0"/>
+              <a:t>Stalno reproduciranje</a:t>
+            </a:r>
+          </a:p>
+          <a:p>
+            <a:pPr lvl="1"/>
+            <a:r>
+              <a:rPr lang="hr-HR" dirty="0" smtClean="0"/>
+              <a:t>Osvježavanje položaja u svakoj iteraciji petlje</a:t>
+            </a:r>
+          </a:p>
+          <a:p>
+            <a:pPr lvl="1"/>
+            <a:r>
+              <a:rPr lang="hr-HR" dirty="0" smtClean="0"/>
+              <a:t>Brzina reprodukcije ovisna o brzini automobila</a:t>
+            </a:r>
+          </a:p>
+          <a:p>
+            <a:endParaRPr lang="hr-HR" dirty="0" smtClean="0"/>
+          </a:p>
+          <a:p>
+            <a:r>
+              <a:rPr lang="hr-HR" dirty="0" smtClean="0"/>
+              <a:t>Zvuk škripanja guma</a:t>
+            </a:r>
+          </a:p>
+          <a:p>
+            <a:pPr lvl="1"/>
+            <a:r>
+              <a:rPr lang="hr-HR" dirty="0" smtClean="0"/>
+              <a:t>Osvježavanje položaja</a:t>
+            </a:r>
+          </a:p>
+          <a:p>
+            <a:pPr lvl="1"/>
+            <a:r>
+              <a:rPr lang="hr-HR" dirty="0" smtClean="0"/>
+              <a:t>Reprodukcija ovisi o stanju automobila</a:t>
+            </a:r>
+          </a:p>
+        </p:txBody>
+      </p:sp>
+    </p:spTree>
+    <p:extLst>
+      <p:ext uri="{BB962C8B-B14F-4D97-AF65-F5344CB8AC3E}">
+        <p14:creationId xmlns:p14="http://schemas.microsoft.com/office/powerpoint/2010/main" val="3096897854"/>
       </p:ext>
     </p:extLst>
   </p:cSld>

</xml_diff>

<commit_message>
Revert "Prezentacija za Leap"
This reverts commit 40bfac70ac93198b5b93637165ceeb09012e0c6d.
</commit_message>
<xml_diff>
--- a/Dokumentacija/Prezentacija.pptx
+++ b/Dokumentacija/Prezentacija.pptx
@@ -14,8 +14,6 @@
     <p:sldId id="261" r:id="rId8"/>
     <p:sldId id="262" r:id="rId9"/>
     <p:sldId id="263" r:id="rId10"/>
-    <p:sldId id="265" r:id="rId11"/>
-    <p:sldId id="266" r:id="rId12"/>
   </p:sldIdLst>
   <p:sldSz cx="9144000" cy="6858000" type="screen4x3"/>
   <p:notesSz cx="6858000" cy="9144000"/>
@@ -310,7 +308,7 @@
             <a:fld id="{1D8BD707-D9CF-40AE-B4C6-C98DA3205C09}" type="datetimeFigureOut">
               <a:rPr lang="en-US" smtClean="0"/>
               <a:pPr/>
-              <a:t>1/8/2015</a:t>
+              <a:t>1/7/2015</a:t>
             </a:fld>
             <a:endParaRPr lang="en-US"/>
           </a:p>
@@ -477,7 +475,7 @@
             <a:fld id="{1D8BD707-D9CF-40AE-B4C6-C98DA3205C09}" type="datetimeFigureOut">
               <a:rPr lang="en-US" smtClean="0"/>
               <a:pPr/>
-              <a:t>1/8/2015</a:t>
+              <a:t>1/7/2015</a:t>
             </a:fld>
             <a:endParaRPr lang="en-US"/>
           </a:p>
@@ -654,7 +652,7 @@
             <a:fld id="{1D8BD707-D9CF-40AE-B4C6-C98DA3205C09}" type="datetimeFigureOut">
               <a:rPr lang="en-US" smtClean="0"/>
               <a:pPr/>
-              <a:t>1/8/2015</a:t>
+              <a:t>1/7/2015</a:t>
             </a:fld>
             <a:endParaRPr lang="en-US"/>
           </a:p>
@@ -839,7 +837,7 @@
             <a:fld id="{1D8BD707-D9CF-40AE-B4C6-C98DA3205C09}" type="datetimeFigureOut">
               <a:rPr lang="en-US" smtClean="0"/>
               <a:pPr/>
-              <a:t>1/8/2015</a:t>
+              <a:t>1/7/2015</a:t>
             </a:fld>
             <a:endParaRPr lang="en-US"/>
           </a:p>
@@ -1103,7 +1101,7 @@
             <a:fld id="{1D8BD707-D9CF-40AE-B4C6-C98DA3205C09}" type="datetimeFigureOut">
               <a:rPr lang="en-US" smtClean="0"/>
               <a:pPr/>
-              <a:t>1/8/2015</a:t>
+              <a:t>1/7/2015</a:t>
             </a:fld>
             <a:endParaRPr lang="en-US"/>
           </a:p>
@@ -1453,7 +1451,7 @@
             <a:fld id="{1D8BD707-D9CF-40AE-B4C6-C98DA3205C09}" type="datetimeFigureOut">
               <a:rPr lang="en-US" smtClean="0"/>
               <a:pPr/>
-              <a:t>1/8/2015</a:t>
+              <a:t>1/7/2015</a:t>
             </a:fld>
             <a:endParaRPr lang="en-US"/>
           </a:p>
@@ -1763,7 +1761,7 @@
             <a:fld id="{1D8BD707-D9CF-40AE-B4C6-C98DA3205C09}" type="datetimeFigureOut">
               <a:rPr lang="en-US" smtClean="0"/>
               <a:pPr/>
-              <a:t>1/8/2015</a:t>
+              <a:t>1/7/2015</a:t>
             </a:fld>
             <a:endParaRPr lang="en-US"/>
           </a:p>
@@ -1992,7 +1990,7 @@
             <a:fld id="{1D8BD707-D9CF-40AE-B4C6-C98DA3205C09}" type="datetimeFigureOut">
               <a:rPr lang="en-US" smtClean="0"/>
               <a:pPr/>
-              <a:t>1/8/2015</a:t>
+              <a:t>1/7/2015</a:t>
             </a:fld>
             <a:endParaRPr lang="en-US"/>
           </a:p>
@@ -2084,7 +2082,7 @@
             <a:fld id="{1D8BD707-D9CF-40AE-B4C6-C98DA3205C09}" type="datetimeFigureOut">
               <a:rPr lang="en-US" smtClean="0"/>
               <a:pPr/>
-              <a:t>1/8/2015</a:t>
+              <a:t>1/7/2015</a:t>
             </a:fld>
             <a:endParaRPr lang="en-US"/>
           </a:p>
@@ -2374,7 +2372,7 @@
             <a:fld id="{1D8BD707-D9CF-40AE-B4C6-C98DA3205C09}" type="datetimeFigureOut">
               <a:rPr lang="en-US" smtClean="0"/>
               <a:pPr/>
-              <a:t>1/8/2015</a:t>
+              <a:t>1/7/2015</a:t>
             </a:fld>
             <a:endParaRPr lang="en-US"/>
           </a:p>
@@ -2645,7 +2643,7 @@
             <a:fld id="{1D8BD707-D9CF-40AE-B4C6-C98DA3205C09}" type="datetimeFigureOut">
               <a:rPr lang="en-US" smtClean="0"/>
               <a:pPr/>
-              <a:t>1/8/2015</a:t>
+              <a:t>1/7/2015</a:t>
             </a:fld>
             <a:endParaRPr lang="en-US"/>
           </a:p>
@@ -2857,7 +2855,7 @@
             <a:fld id="{1D8BD707-D9CF-40AE-B4C6-C98DA3205C09}" type="datetimeFigureOut">
               <a:rPr lang="en-US" smtClean="0"/>
               <a:pPr/>
-              <a:t>1/8/2015</a:t>
+              <a:t>1/7/2015</a:t>
             </a:fld>
             <a:endParaRPr lang="en-US"/>
           </a:p>
@@ -3446,367 +3444,6 @@
       </p:par>
     </p:tnLst>
   </p:timing>
-</p:sld>
-</file>
-
-<file path=ppt/slides/slide10.xml><?xml version="1.0" encoding="utf-8"?>
-<p:sld xmlns:a="http://schemas.openxmlformats.org/drawingml/2006/main" xmlns:r="http://schemas.openxmlformats.org/officeDocument/2006/relationships" xmlns:p="http://schemas.openxmlformats.org/presentationml/2006/main">
-  <p:cSld>
-    <p:spTree>
-      <p:nvGrpSpPr>
-        <p:cNvPr id="1" name=""/>
-        <p:cNvGrpSpPr/>
-        <p:nvPr/>
-      </p:nvGrpSpPr>
-      <p:grpSpPr>
-        <a:xfrm>
-          <a:off x="0" y="0"/>
-          <a:ext cx="0" cy="0"/>
-          <a:chOff x="0" y="0"/>
-          <a:chExt cx="0" cy="0"/>
-        </a:xfrm>
-      </p:grpSpPr>
-      <p:sp>
-        <p:nvSpPr>
-          <p:cNvPr id="2" name="Title 1"/>
-          <p:cNvSpPr>
-            <a:spLocks noGrp="1"/>
-          </p:cNvSpPr>
-          <p:nvPr>
-            <p:ph type="title"/>
-          </p:nvPr>
-        </p:nvSpPr>
-        <p:spPr/>
-        <p:txBody>
-          <a:bodyPr/>
-          <a:lstStyle/>
-          <a:p>
-            <a:r>
-              <a:rPr lang="en-US" dirty="0" smtClean="0"/>
-              <a:t>Leap Motion </a:t>
-            </a:r>
-            <a:r>
-              <a:rPr lang="en-US" dirty="0" err="1" smtClean="0"/>
-              <a:t>kontroler</a:t>
-            </a:r>
-            <a:endParaRPr lang="hr-HR" dirty="0"/>
-          </a:p>
-        </p:txBody>
-      </p:sp>
-      <p:sp>
-        <p:nvSpPr>
-          <p:cNvPr id="5" name="Content Placeholder 4"/>
-          <p:cNvSpPr>
-            <a:spLocks noGrp="1"/>
-          </p:cNvSpPr>
-          <p:nvPr>
-            <p:ph idx="1"/>
-          </p:nvPr>
-        </p:nvSpPr>
-        <p:spPr/>
-        <p:txBody>
-          <a:bodyPr/>
-          <a:lstStyle/>
-          <a:p>
-            <a:r>
-              <a:rPr lang="en-US" dirty="0" smtClean="0"/>
-              <a:t>3 IR LED</a:t>
-            </a:r>
-          </a:p>
-          <a:p>
-            <a:r>
-              <a:rPr lang="en-US" dirty="0" smtClean="0"/>
-              <a:t>2 IR </a:t>
-            </a:r>
-            <a:r>
-              <a:rPr lang="en-US" dirty="0" err="1"/>
-              <a:t>k</a:t>
-            </a:r>
-            <a:r>
-              <a:rPr lang="en-US" dirty="0" err="1" smtClean="0"/>
-              <a:t>amere</a:t>
-            </a:r>
-            <a:endParaRPr lang="en-US" dirty="0" smtClean="0"/>
-          </a:p>
-          <a:p>
-            <a:r>
-              <a:rPr lang="en-US" dirty="0" err="1" smtClean="0"/>
-              <a:t>Komplicirana</a:t>
-            </a:r>
-            <a:r>
-              <a:rPr lang="en-US" dirty="0" smtClean="0"/>
-              <a:t> </a:t>
-            </a:r>
-            <a:r>
-              <a:rPr lang="en-US" dirty="0" err="1" smtClean="0"/>
-              <a:t>matematika</a:t>
-            </a:r>
-            <a:endParaRPr lang="en-US" dirty="0" smtClean="0"/>
-          </a:p>
-          <a:p>
-            <a:r>
-              <a:rPr lang="en-US" dirty="0" err="1" smtClean="0"/>
-              <a:t>Rekonstrukcija</a:t>
-            </a:r>
-            <a:r>
-              <a:rPr lang="en-US" dirty="0" smtClean="0"/>
-              <a:t> </a:t>
-            </a:r>
-            <a:r>
-              <a:rPr lang="en-US" dirty="0" err="1" smtClean="0"/>
-              <a:t>pokreta</a:t>
-            </a:r>
-            <a:r>
-              <a:rPr lang="en-US" dirty="0" smtClean="0"/>
-              <a:t/>
-            </a:r>
-            <a:br>
-              <a:rPr lang="en-US" dirty="0" smtClean="0"/>
-            </a:br>
-            <a:r>
-              <a:rPr lang="hr-HR" dirty="0" smtClean="0"/>
-              <a:t>šaka i prstiju </a:t>
-            </a:r>
-            <a:r>
-              <a:rPr lang="en-US" dirty="0" err="1" smtClean="0"/>
-              <a:t>iznad</a:t>
-            </a:r>
-            <a:r>
-              <a:rPr lang="en-US" dirty="0" smtClean="0"/>
-              <a:t> </a:t>
-            </a:r>
-            <a:r>
-              <a:rPr lang="en-US" dirty="0" err="1" smtClean="0"/>
-              <a:t>ure</a:t>
-            </a:r>
-            <a:r>
-              <a:rPr lang="hr-HR" dirty="0"/>
-              <a:t>đ</a:t>
-            </a:r>
-            <a:r>
-              <a:rPr lang="en-US" dirty="0" err="1" smtClean="0"/>
-              <a:t>aja</a:t>
-            </a:r>
-            <a:endParaRPr lang="hr-HR" dirty="0"/>
-          </a:p>
-        </p:txBody>
-      </p:sp>
-      <p:pic>
-        <p:nvPicPr>
-          <p:cNvPr id="1026" name="Picture 2" descr="C:\Projects\CMakeProjects\IG-Project\Dokumentacija\leap-controller.jpg"/>
-          <p:cNvPicPr>
-            <a:picLocks noChangeAspect="1" noChangeArrowheads="1"/>
-          </p:cNvPicPr>
-          <p:nvPr/>
-        </p:nvPicPr>
-        <p:blipFill>
-          <a:blip r:embed="rId2">
-            <a:extLst>
-              <a:ext uri="{28A0092B-C50C-407E-A947-70E740481C1C}">
-                <a14:useLocalDpi xmlns:a14="http://schemas.microsoft.com/office/drawing/2010/main" val="0"/>
-              </a:ext>
-            </a:extLst>
-          </a:blip>
-          <a:srcRect/>
-          <a:stretch>
-            <a:fillRect/>
-          </a:stretch>
-        </p:blipFill>
-        <p:spPr bwMode="auto">
-          <a:xfrm>
-            <a:off x="4953000" y="2223911"/>
-            <a:ext cx="3600626" cy="2973490"/>
-          </a:xfrm>
-          <a:prstGeom prst="rect">
-            <a:avLst/>
-          </a:prstGeom>
-          <a:noFill/>
-          <a:extLst>
-            <a:ext uri="{909E8E84-426E-40DD-AFC4-6F175D3DCCD1}">
-              <a14:hiddenFill xmlns:a14="http://schemas.microsoft.com/office/drawing/2010/main">
-                <a:solidFill>
-                  <a:srgbClr val="FFFFFF"/>
-                </a:solidFill>
-              </a14:hiddenFill>
-            </a:ext>
-          </a:extLst>
-        </p:spPr>
-      </p:pic>
-    </p:spTree>
-    <p:extLst>
-      <p:ext uri="{BB962C8B-B14F-4D97-AF65-F5344CB8AC3E}">
-        <p14:creationId xmlns:p14="http://schemas.microsoft.com/office/powerpoint/2010/main" val="3037622180"/>
-      </p:ext>
-    </p:extLst>
-  </p:cSld>
-  <p:clrMapOvr>
-    <a:masterClrMapping/>
-  </p:clrMapOvr>
-</p:sld>
-</file>
-
-<file path=ppt/slides/slide11.xml><?xml version="1.0" encoding="utf-8"?>
-<p:sld xmlns:a="http://schemas.openxmlformats.org/drawingml/2006/main" xmlns:r="http://schemas.openxmlformats.org/officeDocument/2006/relationships" xmlns:p="http://schemas.openxmlformats.org/presentationml/2006/main">
-  <p:cSld>
-    <p:spTree>
-      <p:nvGrpSpPr>
-        <p:cNvPr id="1" name=""/>
-        <p:cNvGrpSpPr/>
-        <p:nvPr/>
-      </p:nvGrpSpPr>
-      <p:grpSpPr>
-        <a:xfrm>
-          <a:off x="0" y="0"/>
-          <a:ext cx="0" cy="0"/>
-          <a:chOff x="0" y="0"/>
-          <a:chExt cx="0" cy="0"/>
-        </a:xfrm>
-      </p:grpSpPr>
-      <p:sp>
-        <p:nvSpPr>
-          <p:cNvPr id="2" name="Title 1"/>
-          <p:cNvSpPr>
-            <a:spLocks noGrp="1"/>
-          </p:cNvSpPr>
-          <p:nvPr>
-            <p:ph type="title"/>
-          </p:nvPr>
-        </p:nvSpPr>
-        <p:spPr/>
-        <p:txBody>
-          <a:bodyPr/>
-          <a:lstStyle/>
-          <a:p>
-            <a:r>
-              <a:rPr lang="hr-HR" dirty="0" smtClean="0"/>
-              <a:t>Upravljanje autom</a:t>
-            </a:r>
-            <a:endParaRPr lang="hr-HR" dirty="0"/>
-          </a:p>
-        </p:txBody>
-      </p:sp>
-      <p:sp>
-        <p:nvSpPr>
-          <p:cNvPr id="3" name="Content Placeholder 2"/>
-          <p:cNvSpPr>
-            <a:spLocks noGrp="1"/>
-          </p:cNvSpPr>
-          <p:nvPr>
-            <p:ph idx="1"/>
-          </p:nvPr>
-        </p:nvSpPr>
-        <p:spPr/>
-        <p:txBody>
-          <a:bodyPr/>
-          <a:lstStyle/>
-          <a:p>
-            <a:r>
-              <a:rPr lang="hr-HR" dirty="0" smtClean="0"/>
-              <a:t>Leap detektira dlan</a:t>
-            </a:r>
-          </a:p>
-          <a:p>
-            <a:r>
-              <a:rPr lang="hr-HR" dirty="0" smtClean="0"/>
-              <a:t>Koristi se vektor normale</a:t>
-            </a:r>
-            <a:br>
-              <a:rPr lang="hr-HR" dirty="0" smtClean="0"/>
-            </a:br>
-            <a:r>
-              <a:rPr lang="hr-HR" dirty="0" smtClean="0"/>
-              <a:t>na dlan </a:t>
-            </a:r>
-            <a:r>
-              <a:rPr lang="en-US" dirty="0" err="1" smtClean="0"/>
-              <a:t>za</a:t>
-            </a:r>
-            <a:r>
-              <a:rPr lang="en-US" dirty="0" smtClean="0"/>
-              <a:t> </a:t>
-            </a:r>
-            <a:r>
-              <a:rPr lang="en-US" dirty="0" err="1" smtClean="0"/>
-              <a:t>usmjeravanje</a:t>
-            </a:r>
-            <a:r>
-              <a:rPr lang="en-US" dirty="0"/>
-              <a:t/>
-            </a:r>
-            <a:br>
-              <a:rPr lang="en-US" dirty="0"/>
-            </a:br>
-            <a:r>
-              <a:rPr lang="en-US" dirty="0" smtClean="0"/>
-              <a:t>i </a:t>
-            </a:r>
-            <a:r>
-              <a:rPr lang="en-US" dirty="0" err="1" smtClean="0"/>
-              <a:t>pokretanje</a:t>
-            </a:r>
-            <a:r>
-              <a:rPr lang="en-US" dirty="0" smtClean="0"/>
-              <a:t> </a:t>
-            </a:r>
-            <a:r>
-              <a:rPr lang="en-US" dirty="0" err="1" smtClean="0"/>
-              <a:t>auta</a:t>
-            </a:r>
-            <a:endParaRPr lang="hr-HR" dirty="0"/>
-          </a:p>
-        </p:txBody>
-      </p:sp>
-      <p:pic>
-        <p:nvPicPr>
-          <p:cNvPr id="2050" name="Picture 2" descr="C:\Projects\CMakeProjects\IG-Project\Dokumentacija\leap-ruka.png"/>
-          <p:cNvPicPr>
-            <a:picLocks noChangeAspect="1" noChangeArrowheads="1"/>
-          </p:cNvPicPr>
-          <p:nvPr/>
-        </p:nvPicPr>
-        <p:blipFill>
-          <a:blip r:embed="rId2">
-            <a:extLst>
-              <a:ext uri="{28A0092B-C50C-407E-A947-70E740481C1C}">
-                <a14:useLocalDpi xmlns:a14="http://schemas.microsoft.com/office/drawing/2010/main" val="0"/>
-              </a:ext>
-            </a:extLst>
-          </a:blip>
-          <a:srcRect/>
-          <a:stretch>
-            <a:fillRect/>
-          </a:stretch>
-        </p:blipFill>
-        <p:spPr bwMode="auto">
-          <a:xfrm>
-            <a:off x="4876800" y="2514599"/>
-            <a:ext cx="3524250" cy="2638425"/>
-          </a:xfrm>
-          <a:prstGeom prst="rect">
-            <a:avLst/>
-          </a:prstGeom>
-          <a:noFill/>
-          <a:extLst>
-            <a:ext uri="{909E8E84-426E-40DD-AFC4-6F175D3DCCD1}">
-              <a14:hiddenFill xmlns:a14="http://schemas.microsoft.com/office/drawing/2010/main">
-                <a:solidFill>
-                  <a:srgbClr val="FFFFFF"/>
-                </a:solidFill>
-              </a14:hiddenFill>
-            </a:ext>
-          </a:extLst>
-        </p:spPr>
-      </p:pic>
-    </p:spTree>
-    <p:extLst>
-      <p:ext uri="{BB962C8B-B14F-4D97-AF65-F5344CB8AC3E}">
-        <p14:creationId xmlns:p14="http://schemas.microsoft.com/office/powerpoint/2010/main" val="4152293938"/>
-      </p:ext>
-    </p:extLst>
-  </p:cSld>
-  <p:clrMapOvr>
-    <a:masterClrMapping/>
-  </p:clrMapOvr>
 </p:sld>
 </file>
 

</xml_diff>

<commit_message>
Prezentacija za Leap, drugi pokusaj
</commit_message>
<xml_diff>
--- a/Dokumentacija/Prezentacija.pptx
+++ b/Dokumentacija/Prezentacija.pptx
@@ -14,6 +14,13 @@
     <p:sldId id="261" r:id="rId8"/>
     <p:sldId id="262" r:id="rId9"/>
     <p:sldId id="263" r:id="rId10"/>
+    <p:sldId id="265" r:id="rId11"/>
+    <p:sldId id="266" r:id="rId12"/>
+    <p:sldId id="267" r:id="rId13"/>
+    <p:sldId id="268" r:id="rId14"/>
+    <p:sldId id="269" r:id="rId15"/>
+    <p:sldId id="270" r:id="rId16"/>
+    <p:sldId id="271" r:id="rId17"/>
   </p:sldIdLst>
   <p:sldSz cx="9144000" cy="6858000" type="screen4x3"/>
   <p:notesSz cx="6858000" cy="9144000"/>
@@ -308,7 +315,7 @@
             <a:fld id="{1D8BD707-D9CF-40AE-B4C6-C98DA3205C09}" type="datetimeFigureOut">
               <a:rPr lang="en-US" smtClean="0"/>
               <a:pPr/>
-              <a:t>1/7/2015</a:t>
+              <a:t>1/8/2015</a:t>
             </a:fld>
             <a:endParaRPr lang="en-US"/>
           </a:p>
@@ -475,7 +482,7 @@
             <a:fld id="{1D8BD707-D9CF-40AE-B4C6-C98DA3205C09}" type="datetimeFigureOut">
               <a:rPr lang="en-US" smtClean="0"/>
               <a:pPr/>
-              <a:t>1/7/2015</a:t>
+              <a:t>1/8/2015</a:t>
             </a:fld>
             <a:endParaRPr lang="en-US"/>
           </a:p>
@@ -652,7 +659,7 @@
             <a:fld id="{1D8BD707-D9CF-40AE-B4C6-C98DA3205C09}" type="datetimeFigureOut">
               <a:rPr lang="en-US" smtClean="0"/>
               <a:pPr/>
-              <a:t>1/7/2015</a:t>
+              <a:t>1/8/2015</a:t>
             </a:fld>
             <a:endParaRPr lang="en-US"/>
           </a:p>
@@ -837,7 +844,7 @@
             <a:fld id="{1D8BD707-D9CF-40AE-B4C6-C98DA3205C09}" type="datetimeFigureOut">
               <a:rPr lang="en-US" smtClean="0"/>
               <a:pPr/>
-              <a:t>1/7/2015</a:t>
+              <a:t>1/8/2015</a:t>
             </a:fld>
             <a:endParaRPr lang="en-US"/>
           </a:p>
@@ -1101,7 +1108,7 @@
             <a:fld id="{1D8BD707-D9CF-40AE-B4C6-C98DA3205C09}" type="datetimeFigureOut">
               <a:rPr lang="en-US" smtClean="0"/>
               <a:pPr/>
-              <a:t>1/7/2015</a:t>
+              <a:t>1/8/2015</a:t>
             </a:fld>
             <a:endParaRPr lang="en-US"/>
           </a:p>
@@ -1451,7 +1458,7 @@
             <a:fld id="{1D8BD707-D9CF-40AE-B4C6-C98DA3205C09}" type="datetimeFigureOut">
               <a:rPr lang="en-US" smtClean="0"/>
               <a:pPr/>
-              <a:t>1/7/2015</a:t>
+              <a:t>1/8/2015</a:t>
             </a:fld>
             <a:endParaRPr lang="en-US"/>
           </a:p>
@@ -1761,7 +1768,7 @@
             <a:fld id="{1D8BD707-D9CF-40AE-B4C6-C98DA3205C09}" type="datetimeFigureOut">
               <a:rPr lang="en-US" smtClean="0"/>
               <a:pPr/>
-              <a:t>1/7/2015</a:t>
+              <a:t>1/8/2015</a:t>
             </a:fld>
             <a:endParaRPr lang="en-US"/>
           </a:p>
@@ -1990,7 +1997,7 @@
             <a:fld id="{1D8BD707-D9CF-40AE-B4C6-C98DA3205C09}" type="datetimeFigureOut">
               <a:rPr lang="en-US" smtClean="0"/>
               <a:pPr/>
-              <a:t>1/7/2015</a:t>
+              <a:t>1/8/2015</a:t>
             </a:fld>
             <a:endParaRPr lang="en-US"/>
           </a:p>
@@ -2082,7 +2089,7 @@
             <a:fld id="{1D8BD707-D9CF-40AE-B4C6-C98DA3205C09}" type="datetimeFigureOut">
               <a:rPr lang="en-US" smtClean="0"/>
               <a:pPr/>
-              <a:t>1/7/2015</a:t>
+              <a:t>1/8/2015</a:t>
             </a:fld>
             <a:endParaRPr lang="en-US"/>
           </a:p>
@@ -2372,7 +2379,7 @@
             <a:fld id="{1D8BD707-D9CF-40AE-B4C6-C98DA3205C09}" type="datetimeFigureOut">
               <a:rPr lang="en-US" smtClean="0"/>
               <a:pPr/>
-              <a:t>1/7/2015</a:t>
+              <a:t>1/8/2015</a:t>
             </a:fld>
             <a:endParaRPr lang="en-US"/>
           </a:p>
@@ -2643,7 +2650,7 @@
             <a:fld id="{1D8BD707-D9CF-40AE-B4C6-C98DA3205C09}" type="datetimeFigureOut">
               <a:rPr lang="en-US" smtClean="0"/>
               <a:pPr/>
-              <a:t>1/7/2015</a:t>
+              <a:t>1/8/2015</a:t>
             </a:fld>
             <a:endParaRPr lang="en-US"/>
           </a:p>
@@ -2855,7 +2862,7 @@
             <a:fld id="{1D8BD707-D9CF-40AE-B4C6-C98DA3205C09}" type="datetimeFigureOut">
               <a:rPr lang="en-US" smtClean="0"/>
               <a:pPr/>
-              <a:t>1/7/2015</a:t>
+              <a:t>1/8/2015</a:t>
             </a:fld>
             <a:endParaRPr lang="en-US"/>
           </a:p>
@@ -3444,6 +3451,956 @@
       </p:par>
     </p:tnLst>
   </p:timing>
+</p:sld>
+</file>
+
+<file path=ppt/slides/slide10.xml><?xml version="1.0" encoding="utf-8"?>
+<p:sld xmlns:a="http://schemas.openxmlformats.org/drawingml/2006/main" xmlns:r="http://schemas.openxmlformats.org/officeDocument/2006/relationships" xmlns:p="http://schemas.openxmlformats.org/presentationml/2006/main">
+  <p:cSld>
+    <p:spTree>
+      <p:nvGrpSpPr>
+        <p:cNvPr id="1" name=""/>
+        <p:cNvGrpSpPr/>
+        <p:nvPr/>
+      </p:nvGrpSpPr>
+      <p:grpSpPr>
+        <a:xfrm>
+          <a:off x="0" y="0"/>
+          <a:ext cx="0" cy="0"/>
+          <a:chOff x="0" y="0"/>
+          <a:chExt cx="0" cy="0"/>
+        </a:xfrm>
+      </p:grpSpPr>
+      <p:sp>
+        <p:nvSpPr>
+          <p:cNvPr id="4" name="Title 3"/>
+          <p:cNvSpPr>
+            <a:spLocks noGrp="1"/>
+          </p:cNvSpPr>
+          <p:nvPr>
+            <p:ph type="title"/>
+          </p:nvPr>
+        </p:nvSpPr>
+        <p:spPr/>
+        <p:txBody>
+          <a:bodyPr/>
+          <a:lstStyle/>
+          <a:p>
+            <a:r>
+              <a:rPr lang="hr-HR" dirty="0" smtClean="0"/>
+              <a:t>Zvučna simulacija</a:t>
+            </a:r>
+            <a:endParaRPr lang="hr-HR" dirty="0"/>
+          </a:p>
+        </p:txBody>
+      </p:sp>
+      <p:sp>
+        <p:nvSpPr>
+          <p:cNvPr id="5" name="Text Placeholder 4"/>
+          <p:cNvSpPr>
+            <a:spLocks noGrp="1"/>
+          </p:cNvSpPr>
+          <p:nvPr>
+            <p:ph type="body" idx="1"/>
+          </p:nvPr>
+        </p:nvSpPr>
+        <p:spPr/>
+        <p:txBody>
+          <a:bodyPr/>
+          <a:lstStyle/>
+          <a:p>
+            <a:endParaRPr lang="hr-HR" dirty="0"/>
+          </a:p>
+        </p:txBody>
+      </p:sp>
+    </p:spTree>
+    <p:extLst>
+      <p:ext uri="{BB962C8B-B14F-4D97-AF65-F5344CB8AC3E}">
+        <p14:creationId xmlns:p14="http://schemas.microsoft.com/office/powerpoint/2010/main" val="2267565220"/>
+      </p:ext>
+    </p:extLst>
+  </p:cSld>
+  <p:clrMapOvr>
+    <a:masterClrMapping/>
+  </p:clrMapOvr>
+  <p:timing>
+    <p:tnLst>
+      <p:par>
+        <p:cTn id="1" dur="indefinite" restart="never" nodeType="tmRoot"/>
+      </p:par>
+    </p:tnLst>
+  </p:timing>
+</p:sld>
+</file>
+
+<file path=ppt/slides/slide11.xml><?xml version="1.0" encoding="utf-8"?>
+<p:sld xmlns:a="http://schemas.openxmlformats.org/drawingml/2006/main" xmlns:r="http://schemas.openxmlformats.org/officeDocument/2006/relationships" xmlns:p="http://schemas.openxmlformats.org/presentationml/2006/main">
+  <p:cSld>
+    <p:spTree>
+      <p:nvGrpSpPr>
+        <p:cNvPr id="1" name=""/>
+        <p:cNvGrpSpPr/>
+        <p:nvPr/>
+      </p:nvGrpSpPr>
+      <p:grpSpPr>
+        <a:xfrm>
+          <a:off x="0" y="0"/>
+          <a:ext cx="0" cy="0"/>
+          <a:chOff x="0" y="0"/>
+          <a:chExt cx="0" cy="0"/>
+        </a:xfrm>
+      </p:grpSpPr>
+      <p:sp>
+        <p:nvSpPr>
+          <p:cNvPr id="2" name="Title 1"/>
+          <p:cNvSpPr>
+            <a:spLocks noGrp="1"/>
+          </p:cNvSpPr>
+          <p:nvPr>
+            <p:ph type="title"/>
+          </p:nvPr>
+        </p:nvSpPr>
+        <p:spPr/>
+        <p:txBody>
+          <a:bodyPr/>
+          <a:lstStyle/>
+          <a:p>
+            <a:r>
+              <a:rPr lang="hr-HR" dirty="0" smtClean="0"/>
+              <a:t>Izvori zvukova</a:t>
+            </a:r>
+            <a:endParaRPr lang="hr-HR" dirty="0"/>
+          </a:p>
+        </p:txBody>
+      </p:sp>
+      <p:sp>
+        <p:nvSpPr>
+          <p:cNvPr id="3" name="Content Placeholder 2"/>
+          <p:cNvSpPr>
+            <a:spLocks noGrp="1"/>
+          </p:cNvSpPr>
+          <p:nvPr>
+            <p:ph idx="1"/>
+          </p:nvPr>
+        </p:nvSpPr>
+        <p:spPr/>
+        <p:txBody>
+          <a:bodyPr/>
+          <a:lstStyle/>
+          <a:p>
+            <a:r>
+              <a:rPr lang="hr-HR" dirty="0" smtClean="0"/>
+              <a:t>Učitavanje iz zvučnih datoteka</a:t>
+            </a:r>
+          </a:p>
+          <a:p>
+            <a:pPr lvl="1"/>
+            <a:r>
+              <a:rPr lang="hr-HR" dirty="0" smtClean="0"/>
+              <a:t>U RAM ili direktna reprodukcija sa tvrdog diska</a:t>
+            </a:r>
+          </a:p>
+          <a:p>
+            <a:pPr lvl="1"/>
+            <a:endParaRPr lang="hr-HR" dirty="0" smtClean="0"/>
+          </a:p>
+          <a:p>
+            <a:r>
+              <a:rPr lang="hr-HR" dirty="0" smtClean="0"/>
+              <a:t>Postavljanje pozicije</a:t>
+            </a:r>
+          </a:p>
+          <a:p>
+            <a:pPr lvl="1"/>
+            <a:r>
+              <a:rPr lang="hr-HR" dirty="0" smtClean="0"/>
+              <a:t>Preko 3D vektora</a:t>
+            </a:r>
+          </a:p>
+          <a:p>
+            <a:pPr lvl="1"/>
+            <a:endParaRPr lang="hr-HR" dirty="0"/>
+          </a:p>
+          <a:p>
+            <a:pPr lvl="1"/>
+            <a:endParaRPr lang="hr-HR" dirty="0"/>
+          </a:p>
+        </p:txBody>
+      </p:sp>
+      <p:pic>
+        <p:nvPicPr>
+          <p:cNvPr id="4" name="Picture 3"/>
+          <p:cNvPicPr>
+            <a:picLocks noChangeAspect="1"/>
+          </p:cNvPicPr>
+          <p:nvPr/>
+        </p:nvPicPr>
+        <p:blipFill>
+          <a:blip r:embed="rId2">
+            <a:extLst>
+              <a:ext uri="{28A0092B-C50C-407E-A947-70E740481C1C}">
+                <a14:useLocalDpi xmlns:a14="http://schemas.microsoft.com/office/drawing/2010/main" val="0"/>
+              </a:ext>
+            </a:extLst>
+          </a:blip>
+          <a:stretch>
+            <a:fillRect/>
+          </a:stretch>
+        </p:blipFill>
+        <p:spPr>
+          <a:xfrm>
+            <a:off x="768607" y="3657600"/>
+            <a:ext cx="7606786" cy="2448000"/>
+          </a:xfrm>
+          <a:prstGeom prst="rect">
+            <a:avLst/>
+          </a:prstGeom>
+        </p:spPr>
+      </p:pic>
+    </p:spTree>
+    <p:extLst>
+      <p:ext uri="{BB962C8B-B14F-4D97-AF65-F5344CB8AC3E}">
+        <p14:creationId xmlns:p14="http://schemas.microsoft.com/office/powerpoint/2010/main" val="3019331709"/>
+      </p:ext>
+    </p:extLst>
+  </p:cSld>
+  <p:clrMapOvr>
+    <a:masterClrMapping/>
+  </p:clrMapOvr>
+  <p:timing>
+    <p:tnLst>
+      <p:par>
+        <p:cTn id="1" dur="indefinite" restart="never" nodeType="tmRoot"/>
+      </p:par>
+    </p:tnLst>
+  </p:timing>
+</p:sld>
+</file>
+
+<file path=ppt/slides/slide12.xml><?xml version="1.0" encoding="utf-8"?>
+<p:sld xmlns:a="http://schemas.openxmlformats.org/drawingml/2006/main" xmlns:r="http://schemas.openxmlformats.org/officeDocument/2006/relationships" xmlns:p="http://schemas.openxmlformats.org/presentationml/2006/main">
+  <p:cSld>
+    <p:spTree>
+      <p:nvGrpSpPr>
+        <p:cNvPr id="1" name=""/>
+        <p:cNvGrpSpPr/>
+        <p:nvPr/>
+      </p:nvGrpSpPr>
+      <p:grpSpPr>
+        <a:xfrm>
+          <a:off x="0" y="0"/>
+          <a:ext cx="0" cy="0"/>
+          <a:chOff x="0" y="0"/>
+          <a:chExt cx="0" cy="0"/>
+        </a:xfrm>
+      </p:grpSpPr>
+      <p:sp>
+        <p:nvSpPr>
+          <p:cNvPr id="2" name="Title 1"/>
+          <p:cNvSpPr>
+            <a:spLocks noGrp="1"/>
+          </p:cNvSpPr>
+          <p:nvPr>
+            <p:ph type="title"/>
+          </p:nvPr>
+        </p:nvSpPr>
+        <p:spPr/>
+        <p:txBody>
+          <a:bodyPr/>
+          <a:lstStyle/>
+          <a:p>
+            <a:r>
+              <a:rPr lang="hr-HR" dirty="0"/>
+              <a:t>S</a:t>
+            </a:r>
+            <a:r>
+              <a:rPr lang="hr-HR" dirty="0" smtClean="0"/>
+              <a:t>lušatelj</a:t>
+            </a:r>
+            <a:endParaRPr lang="hr-HR" dirty="0"/>
+          </a:p>
+        </p:txBody>
+      </p:sp>
+      <p:sp>
+        <p:nvSpPr>
+          <p:cNvPr id="3" name="Content Placeholder 2"/>
+          <p:cNvSpPr>
+            <a:spLocks noGrp="1"/>
+          </p:cNvSpPr>
+          <p:nvPr>
+            <p:ph idx="1"/>
+          </p:nvPr>
+        </p:nvSpPr>
+        <p:spPr/>
+        <p:txBody>
+          <a:bodyPr/>
+          <a:lstStyle/>
+          <a:p>
+            <a:r>
+              <a:rPr lang="hr-HR" dirty="0"/>
+              <a:t>Postavljanje </a:t>
+            </a:r>
+            <a:r>
+              <a:rPr lang="hr-HR" dirty="0" smtClean="0"/>
+              <a:t>pozicije</a:t>
+            </a:r>
+            <a:r>
+              <a:rPr lang="hr-HR" dirty="0"/>
+              <a:t> </a:t>
+            </a:r>
+            <a:r>
+              <a:rPr lang="hr-HR" dirty="0" smtClean="0"/>
+              <a:t>i orijentacije</a:t>
+            </a:r>
+          </a:p>
+          <a:p>
+            <a:pPr lvl="1"/>
+            <a:r>
+              <a:rPr lang="hr-HR" dirty="0" smtClean="0"/>
+              <a:t>Pozicija preko 3D vektora</a:t>
+            </a:r>
+          </a:p>
+          <a:p>
+            <a:pPr lvl="1"/>
+            <a:r>
+              <a:rPr lang="hr-HR" dirty="0" smtClean="0"/>
+              <a:t>Orijentacija preko tri vektora</a:t>
+            </a:r>
+          </a:p>
+          <a:p>
+            <a:pPr lvl="1"/>
+            <a:endParaRPr lang="hr-HR" dirty="0" smtClean="0"/>
+          </a:p>
+          <a:p>
+            <a:r>
+              <a:rPr lang="hr-HR" dirty="0" smtClean="0"/>
+              <a:t>Položaj i orijentacija istovjetni s onima od kamere</a:t>
+            </a:r>
+            <a:endParaRPr lang="hr-HR" dirty="0"/>
+          </a:p>
+          <a:p>
+            <a:endParaRPr lang="hr-HR" dirty="0" smtClean="0"/>
+          </a:p>
+        </p:txBody>
+      </p:sp>
+      <p:pic>
+        <p:nvPicPr>
+          <p:cNvPr id="4" name="Picture 3"/>
+          <p:cNvPicPr>
+            <a:picLocks noChangeAspect="1"/>
+          </p:cNvPicPr>
+          <p:nvPr/>
+        </p:nvPicPr>
+        <p:blipFill>
+          <a:blip r:embed="rId2">
+            <a:extLst>
+              <a:ext uri="{28A0092B-C50C-407E-A947-70E740481C1C}">
+                <a14:useLocalDpi xmlns:a14="http://schemas.microsoft.com/office/drawing/2010/main" val="0"/>
+              </a:ext>
+            </a:extLst>
+          </a:blip>
+          <a:stretch>
+            <a:fillRect/>
+          </a:stretch>
+        </p:blipFill>
+        <p:spPr>
+          <a:xfrm>
+            <a:off x="2986088" y="3657600"/>
+            <a:ext cx="3171825" cy="2219325"/>
+          </a:xfrm>
+          <a:prstGeom prst="rect">
+            <a:avLst/>
+          </a:prstGeom>
+        </p:spPr>
+      </p:pic>
+    </p:spTree>
+    <p:extLst>
+      <p:ext uri="{BB962C8B-B14F-4D97-AF65-F5344CB8AC3E}">
+        <p14:creationId xmlns:p14="http://schemas.microsoft.com/office/powerpoint/2010/main" val="561081063"/>
+      </p:ext>
+    </p:extLst>
+  </p:cSld>
+  <p:clrMapOvr>
+    <a:masterClrMapping/>
+  </p:clrMapOvr>
+  <p:timing>
+    <p:tnLst>
+      <p:par>
+        <p:cTn id="1" dur="indefinite" restart="never" nodeType="tmRoot"/>
+      </p:par>
+    </p:tnLst>
+  </p:timing>
+</p:sld>
+</file>
+
+<file path=ppt/slides/slide13.xml><?xml version="1.0" encoding="utf-8"?>
+<p:sld xmlns:a="http://schemas.openxmlformats.org/drawingml/2006/main" xmlns:r="http://schemas.openxmlformats.org/officeDocument/2006/relationships" xmlns:p="http://schemas.openxmlformats.org/presentationml/2006/main">
+  <p:cSld>
+    <p:spTree>
+      <p:nvGrpSpPr>
+        <p:cNvPr id="1" name=""/>
+        <p:cNvGrpSpPr/>
+        <p:nvPr/>
+      </p:nvGrpSpPr>
+      <p:grpSpPr>
+        <a:xfrm>
+          <a:off x="0" y="0"/>
+          <a:ext cx="0" cy="0"/>
+          <a:chOff x="0" y="0"/>
+          <a:chExt cx="0" cy="0"/>
+        </a:xfrm>
+      </p:grpSpPr>
+      <p:sp>
+        <p:nvSpPr>
+          <p:cNvPr id="2" name="Title 1"/>
+          <p:cNvSpPr>
+            <a:spLocks noGrp="1"/>
+          </p:cNvSpPr>
+          <p:nvPr>
+            <p:ph type="title"/>
+          </p:nvPr>
+        </p:nvSpPr>
+        <p:spPr/>
+        <p:txBody>
+          <a:bodyPr/>
+          <a:lstStyle/>
+          <a:p>
+            <a:r>
+              <a:rPr lang="hr-HR" dirty="0" smtClean="0"/>
+              <a:t>Zvukovi u projektu</a:t>
+            </a:r>
+            <a:endParaRPr lang="hr-HR" dirty="0"/>
+          </a:p>
+        </p:txBody>
+      </p:sp>
+      <p:sp>
+        <p:nvSpPr>
+          <p:cNvPr id="3" name="Content Placeholder 2"/>
+          <p:cNvSpPr>
+            <a:spLocks noGrp="1"/>
+          </p:cNvSpPr>
+          <p:nvPr>
+            <p:ph idx="1"/>
+          </p:nvPr>
+        </p:nvSpPr>
+        <p:spPr/>
+        <p:txBody>
+          <a:bodyPr>
+            <a:normAutofit/>
+          </a:bodyPr>
+          <a:lstStyle/>
+          <a:p>
+            <a:r>
+              <a:rPr lang="hr-HR" dirty="0" smtClean="0"/>
+              <a:t>Zvuk rada motora</a:t>
+            </a:r>
+          </a:p>
+          <a:p>
+            <a:pPr lvl="1"/>
+            <a:r>
+              <a:rPr lang="hr-HR" dirty="0" smtClean="0"/>
+              <a:t>Stalno reproduciranje</a:t>
+            </a:r>
+          </a:p>
+          <a:p>
+            <a:pPr lvl="1"/>
+            <a:r>
+              <a:rPr lang="hr-HR" dirty="0" smtClean="0"/>
+              <a:t>Osvježavanje položaja u svakoj iteraciji petlje</a:t>
+            </a:r>
+          </a:p>
+          <a:p>
+            <a:pPr lvl="1"/>
+            <a:r>
+              <a:rPr lang="hr-HR" dirty="0" smtClean="0"/>
+              <a:t>Brzina reprodukcije ovisna o brzini automobila</a:t>
+            </a:r>
+          </a:p>
+          <a:p>
+            <a:endParaRPr lang="hr-HR" dirty="0" smtClean="0"/>
+          </a:p>
+          <a:p>
+            <a:r>
+              <a:rPr lang="hr-HR" dirty="0" smtClean="0"/>
+              <a:t>Zvuk škripanja guma</a:t>
+            </a:r>
+          </a:p>
+          <a:p>
+            <a:pPr lvl="1"/>
+            <a:r>
+              <a:rPr lang="hr-HR" dirty="0" smtClean="0"/>
+              <a:t>Osvježavanje položaja</a:t>
+            </a:r>
+          </a:p>
+          <a:p>
+            <a:pPr lvl="1"/>
+            <a:r>
+              <a:rPr lang="hr-HR" dirty="0" smtClean="0"/>
+              <a:t>Reprodukcija ovisi o stanju automobila</a:t>
+            </a:r>
+          </a:p>
+        </p:txBody>
+      </p:sp>
+    </p:spTree>
+    <p:extLst>
+      <p:ext uri="{BB962C8B-B14F-4D97-AF65-F5344CB8AC3E}">
+        <p14:creationId xmlns:p14="http://schemas.microsoft.com/office/powerpoint/2010/main" val="3096897854"/>
+      </p:ext>
+    </p:extLst>
+  </p:cSld>
+  <p:clrMapOvr>
+    <a:masterClrMapping/>
+  </p:clrMapOvr>
+  <p:timing>
+    <p:tnLst>
+      <p:par>
+        <p:cTn id="1" dur="indefinite" restart="never" nodeType="tmRoot"/>
+      </p:par>
+    </p:tnLst>
+  </p:timing>
+</p:sld>
+</file>
+
+<file path=ppt/slides/slide14.xml><?xml version="1.0" encoding="utf-8"?>
+<p:sld xmlns:a="http://schemas.openxmlformats.org/drawingml/2006/main" xmlns:r="http://schemas.openxmlformats.org/officeDocument/2006/relationships" xmlns:p="http://schemas.openxmlformats.org/presentationml/2006/main">
+  <p:cSld>
+    <p:spTree>
+      <p:nvGrpSpPr>
+        <p:cNvPr id="1" name=""/>
+        <p:cNvGrpSpPr/>
+        <p:nvPr/>
+      </p:nvGrpSpPr>
+      <p:grpSpPr>
+        <a:xfrm>
+          <a:off x="0" y="0"/>
+          <a:ext cx="0" cy="0"/>
+          <a:chOff x="0" y="0"/>
+          <a:chExt cx="0" cy="0"/>
+        </a:xfrm>
+      </p:grpSpPr>
+      <p:sp>
+        <p:nvSpPr>
+          <p:cNvPr id="4" name="Title 3"/>
+          <p:cNvSpPr>
+            <a:spLocks noGrp="1"/>
+          </p:cNvSpPr>
+          <p:nvPr>
+            <p:ph type="title"/>
+          </p:nvPr>
+        </p:nvSpPr>
+        <p:spPr/>
+        <p:txBody>
+          <a:bodyPr/>
+          <a:lstStyle/>
+          <a:p>
+            <a:r>
+              <a:rPr lang="en-US" dirty="0" smtClean="0"/>
+              <a:t>Leap Motion</a:t>
+            </a:r>
+            <a:endParaRPr lang="hr-HR" dirty="0"/>
+          </a:p>
+        </p:txBody>
+      </p:sp>
+      <p:sp>
+        <p:nvSpPr>
+          <p:cNvPr id="5" name="Text Placeholder 4"/>
+          <p:cNvSpPr>
+            <a:spLocks noGrp="1"/>
+          </p:cNvSpPr>
+          <p:nvPr>
+            <p:ph type="body" idx="1"/>
+          </p:nvPr>
+        </p:nvSpPr>
+        <p:spPr/>
+        <p:txBody>
+          <a:bodyPr/>
+          <a:lstStyle/>
+          <a:p>
+            <a:endParaRPr lang="hr-HR"/>
+          </a:p>
+        </p:txBody>
+      </p:sp>
+    </p:spTree>
+    <p:extLst>
+      <p:ext uri="{BB962C8B-B14F-4D97-AF65-F5344CB8AC3E}">
+        <p14:creationId xmlns:p14="http://schemas.microsoft.com/office/powerpoint/2010/main" val="2112996390"/>
+      </p:ext>
+    </p:extLst>
+  </p:cSld>
+  <p:clrMapOvr>
+    <a:masterClrMapping/>
+  </p:clrMapOvr>
+</p:sld>
+</file>
+
+<file path=ppt/slides/slide15.xml><?xml version="1.0" encoding="utf-8"?>
+<p:sld xmlns:a="http://schemas.openxmlformats.org/drawingml/2006/main" xmlns:r="http://schemas.openxmlformats.org/officeDocument/2006/relationships" xmlns:p="http://schemas.openxmlformats.org/presentationml/2006/main">
+  <p:cSld>
+    <p:spTree>
+      <p:nvGrpSpPr>
+        <p:cNvPr id="1" name=""/>
+        <p:cNvGrpSpPr/>
+        <p:nvPr/>
+      </p:nvGrpSpPr>
+      <p:grpSpPr>
+        <a:xfrm>
+          <a:off x="0" y="0"/>
+          <a:ext cx="0" cy="0"/>
+          <a:chOff x="0" y="0"/>
+          <a:chExt cx="0" cy="0"/>
+        </a:xfrm>
+      </p:grpSpPr>
+      <p:sp>
+        <p:nvSpPr>
+          <p:cNvPr id="2" name="Title 1"/>
+          <p:cNvSpPr>
+            <a:spLocks noGrp="1"/>
+          </p:cNvSpPr>
+          <p:nvPr>
+            <p:ph type="title"/>
+          </p:nvPr>
+        </p:nvSpPr>
+        <p:spPr/>
+        <p:txBody>
+          <a:bodyPr/>
+          <a:lstStyle/>
+          <a:p>
+            <a:r>
+              <a:rPr lang="en-US" dirty="0" smtClean="0"/>
+              <a:t>Leap Motion </a:t>
+            </a:r>
+            <a:r>
+              <a:rPr lang="en-US" dirty="0" err="1" smtClean="0"/>
+              <a:t>kontroler</a:t>
+            </a:r>
+            <a:endParaRPr lang="hr-HR" dirty="0"/>
+          </a:p>
+        </p:txBody>
+      </p:sp>
+      <p:sp>
+        <p:nvSpPr>
+          <p:cNvPr id="3" name="Content Placeholder 2"/>
+          <p:cNvSpPr>
+            <a:spLocks noGrp="1"/>
+          </p:cNvSpPr>
+          <p:nvPr>
+            <p:ph idx="1"/>
+          </p:nvPr>
+        </p:nvSpPr>
+        <p:spPr/>
+        <p:txBody>
+          <a:bodyPr/>
+          <a:lstStyle/>
+          <a:p>
+            <a:r>
+              <a:rPr lang="en-US" dirty="0"/>
+              <a:t>3 IR LED</a:t>
+            </a:r>
+          </a:p>
+          <a:p>
+            <a:r>
+              <a:rPr lang="en-US" dirty="0"/>
+              <a:t>2 IR </a:t>
+            </a:r>
+            <a:r>
+              <a:rPr lang="en-US" dirty="0" err="1"/>
+              <a:t>kamere</a:t>
+            </a:r>
+            <a:endParaRPr lang="en-US" dirty="0"/>
+          </a:p>
+          <a:p>
+            <a:r>
+              <a:rPr lang="en-US" dirty="0" err="1"/>
+              <a:t>Komplicirana</a:t>
+            </a:r>
+            <a:r>
+              <a:rPr lang="en-US" dirty="0"/>
+              <a:t> </a:t>
+            </a:r>
+            <a:r>
+              <a:rPr lang="en-US" dirty="0" err="1"/>
+              <a:t>matematika</a:t>
+            </a:r>
+            <a:endParaRPr lang="en-US" dirty="0"/>
+          </a:p>
+          <a:p>
+            <a:r>
+              <a:rPr lang="en-US" dirty="0" err="1"/>
+              <a:t>Rekonstrukcija</a:t>
+            </a:r>
+            <a:r>
+              <a:rPr lang="en-US" dirty="0"/>
+              <a:t> </a:t>
+            </a:r>
+            <a:r>
+              <a:rPr lang="en-US" dirty="0" err="1"/>
+              <a:t>pokreta</a:t>
+            </a:r>
+            <a:r>
+              <a:rPr lang="en-US" dirty="0"/>
+              <a:t/>
+            </a:r>
+            <a:br>
+              <a:rPr lang="en-US" dirty="0"/>
+            </a:br>
+            <a:r>
+              <a:rPr lang="hr-HR" dirty="0"/>
+              <a:t>šaka i prstiju </a:t>
+            </a:r>
+            <a:r>
+              <a:rPr lang="en-US" dirty="0" err="1"/>
+              <a:t>iznad</a:t>
+            </a:r>
+            <a:r>
+              <a:rPr lang="en-US" dirty="0"/>
+              <a:t> </a:t>
+            </a:r>
+            <a:r>
+              <a:rPr lang="en-US" dirty="0" err="1"/>
+              <a:t>ure</a:t>
+            </a:r>
+            <a:r>
+              <a:rPr lang="hr-HR" dirty="0"/>
+              <a:t>đ</a:t>
+            </a:r>
+            <a:r>
+              <a:rPr lang="en-US" dirty="0" err="1"/>
+              <a:t>aja</a:t>
+            </a:r>
+            <a:endParaRPr lang="hr-HR" dirty="0"/>
+          </a:p>
+          <a:p>
+            <a:endParaRPr lang="hr-HR" dirty="0"/>
+          </a:p>
+        </p:txBody>
+      </p:sp>
+      <p:pic>
+        <p:nvPicPr>
+          <p:cNvPr id="1026" name="Picture 2" descr="C:\Projects\CMakeProjects\IG-Project\Dokumentacija\leap-controller.jpg"/>
+          <p:cNvPicPr>
+            <a:picLocks noChangeAspect="1" noChangeArrowheads="1"/>
+          </p:cNvPicPr>
+          <p:nvPr/>
+        </p:nvPicPr>
+        <p:blipFill>
+          <a:blip r:embed="rId2">
+            <a:extLst>
+              <a:ext uri="{28A0092B-C50C-407E-A947-70E740481C1C}">
+                <a14:useLocalDpi xmlns:a14="http://schemas.microsoft.com/office/drawing/2010/main" val="0"/>
+              </a:ext>
+            </a:extLst>
+          </a:blip>
+          <a:srcRect/>
+          <a:stretch>
+            <a:fillRect/>
+          </a:stretch>
+        </p:blipFill>
+        <p:spPr bwMode="auto">
+          <a:xfrm>
+            <a:off x="4952999" y="1981200"/>
+            <a:ext cx="3567823" cy="2946400"/>
+          </a:xfrm>
+          <a:prstGeom prst="rect">
+            <a:avLst/>
+          </a:prstGeom>
+          <a:noFill/>
+          <a:extLst>
+            <a:ext uri="{909E8E84-426E-40DD-AFC4-6F175D3DCCD1}">
+              <a14:hiddenFill xmlns:a14="http://schemas.microsoft.com/office/drawing/2010/main">
+                <a:solidFill>
+                  <a:srgbClr val="FFFFFF"/>
+                </a:solidFill>
+              </a14:hiddenFill>
+            </a:ext>
+          </a:extLst>
+        </p:spPr>
+      </p:pic>
+    </p:spTree>
+    <p:extLst>
+      <p:ext uri="{BB962C8B-B14F-4D97-AF65-F5344CB8AC3E}">
+        <p14:creationId xmlns:p14="http://schemas.microsoft.com/office/powerpoint/2010/main" val="2802882405"/>
+      </p:ext>
+    </p:extLst>
+  </p:cSld>
+  <p:clrMapOvr>
+    <a:masterClrMapping/>
+  </p:clrMapOvr>
+</p:sld>
+</file>
+
+<file path=ppt/slides/slide16.xml><?xml version="1.0" encoding="utf-8"?>
+<p:sld xmlns:a="http://schemas.openxmlformats.org/drawingml/2006/main" xmlns:r="http://schemas.openxmlformats.org/officeDocument/2006/relationships" xmlns:p="http://schemas.openxmlformats.org/presentationml/2006/main">
+  <p:cSld>
+    <p:spTree>
+      <p:nvGrpSpPr>
+        <p:cNvPr id="1" name=""/>
+        <p:cNvGrpSpPr/>
+        <p:nvPr/>
+      </p:nvGrpSpPr>
+      <p:grpSpPr>
+        <a:xfrm>
+          <a:off x="0" y="0"/>
+          <a:ext cx="0" cy="0"/>
+          <a:chOff x="0" y="0"/>
+          <a:chExt cx="0" cy="0"/>
+        </a:xfrm>
+      </p:grpSpPr>
+      <p:sp>
+        <p:nvSpPr>
+          <p:cNvPr id="2" name="Title 1"/>
+          <p:cNvSpPr>
+            <a:spLocks noGrp="1"/>
+          </p:cNvSpPr>
+          <p:nvPr>
+            <p:ph type="title"/>
+          </p:nvPr>
+        </p:nvSpPr>
+        <p:spPr/>
+        <p:txBody>
+          <a:bodyPr/>
+          <a:lstStyle/>
+          <a:p>
+            <a:r>
+              <a:rPr lang="en-US" dirty="0" err="1" smtClean="0"/>
+              <a:t>Upravljanje</a:t>
+            </a:r>
+            <a:r>
+              <a:rPr lang="en-US" dirty="0" smtClean="0"/>
+              <a:t> </a:t>
+            </a:r>
+            <a:r>
+              <a:rPr lang="en-US" dirty="0" err="1" smtClean="0"/>
+              <a:t>autom</a:t>
+            </a:r>
+            <a:endParaRPr lang="hr-HR" dirty="0"/>
+          </a:p>
+        </p:txBody>
+      </p:sp>
+      <p:sp>
+        <p:nvSpPr>
+          <p:cNvPr id="3" name="Content Placeholder 2"/>
+          <p:cNvSpPr>
+            <a:spLocks noGrp="1"/>
+          </p:cNvSpPr>
+          <p:nvPr>
+            <p:ph idx="1"/>
+          </p:nvPr>
+        </p:nvSpPr>
+        <p:spPr/>
+        <p:txBody>
+          <a:bodyPr/>
+          <a:lstStyle/>
+          <a:p>
+            <a:r>
+              <a:rPr lang="hr-HR" dirty="0"/>
+              <a:t>Leap detektira dlan</a:t>
+            </a:r>
+          </a:p>
+          <a:p>
+            <a:r>
+              <a:rPr lang="hr-HR" dirty="0"/>
+              <a:t>Koristi se vektor normale</a:t>
+            </a:r>
+            <a:br>
+              <a:rPr lang="hr-HR" dirty="0"/>
+            </a:br>
+            <a:r>
+              <a:rPr lang="hr-HR" dirty="0"/>
+              <a:t>na dlan </a:t>
+            </a:r>
+            <a:r>
+              <a:rPr lang="en-US" dirty="0" err="1"/>
+              <a:t>za</a:t>
+            </a:r>
+            <a:r>
+              <a:rPr lang="en-US" dirty="0"/>
+              <a:t> </a:t>
+            </a:r>
+            <a:r>
+              <a:rPr lang="en-US" dirty="0" err="1"/>
+              <a:t>usmjeravanje</a:t>
+            </a:r>
+            <a:r>
+              <a:rPr lang="en-US" dirty="0"/>
+              <a:t/>
+            </a:r>
+            <a:br>
+              <a:rPr lang="en-US" dirty="0"/>
+            </a:br>
+            <a:r>
+              <a:rPr lang="en-US" dirty="0"/>
+              <a:t>i </a:t>
+            </a:r>
+            <a:r>
+              <a:rPr lang="en-US" dirty="0" err="1"/>
+              <a:t>pokretanje</a:t>
+            </a:r>
+            <a:r>
+              <a:rPr lang="en-US" dirty="0"/>
+              <a:t> </a:t>
+            </a:r>
+            <a:r>
+              <a:rPr lang="en-US" dirty="0" err="1"/>
+              <a:t>auta</a:t>
+            </a:r>
+            <a:endParaRPr lang="hr-HR" dirty="0"/>
+          </a:p>
+          <a:p>
+            <a:endParaRPr lang="hr-HR" dirty="0"/>
+          </a:p>
+        </p:txBody>
+      </p:sp>
+      <p:pic>
+        <p:nvPicPr>
+          <p:cNvPr id="2050" name="Picture 2" descr="C:\Projects\CMakeProjects\IG-Project\Dokumentacija\leap-ruka.png"/>
+          <p:cNvPicPr>
+            <a:picLocks noChangeAspect="1" noChangeArrowheads="1"/>
+          </p:cNvPicPr>
+          <p:nvPr/>
+        </p:nvPicPr>
+        <p:blipFill>
+          <a:blip r:embed="rId2">
+            <a:extLst>
+              <a:ext uri="{28A0092B-C50C-407E-A947-70E740481C1C}">
+                <a14:useLocalDpi xmlns:a14="http://schemas.microsoft.com/office/drawing/2010/main" val="0"/>
+              </a:ext>
+            </a:extLst>
+          </a:blip>
+          <a:srcRect/>
+          <a:stretch>
+            <a:fillRect/>
+          </a:stretch>
+        </p:blipFill>
+        <p:spPr bwMode="auto">
+          <a:xfrm>
+            <a:off x="4725458" y="2312634"/>
+            <a:ext cx="3524250" cy="2638425"/>
+          </a:xfrm>
+          <a:prstGeom prst="rect">
+            <a:avLst/>
+          </a:prstGeom>
+          <a:noFill/>
+          <a:extLst>
+            <a:ext uri="{909E8E84-426E-40DD-AFC4-6F175D3DCCD1}">
+              <a14:hiddenFill xmlns:a14="http://schemas.microsoft.com/office/drawing/2010/main">
+                <a:solidFill>
+                  <a:srgbClr val="FFFFFF"/>
+                </a:solidFill>
+              </a14:hiddenFill>
+            </a:ext>
+          </a:extLst>
+        </p:spPr>
+      </p:pic>
+    </p:spTree>
+    <p:extLst>
+      <p:ext uri="{BB962C8B-B14F-4D97-AF65-F5344CB8AC3E}">
+        <p14:creationId xmlns:p14="http://schemas.microsoft.com/office/powerpoint/2010/main" val="4226438434"/>
+      </p:ext>
+    </p:extLst>
+  </p:cSld>
+  <p:clrMapOvr>
+    <a:masterClrMapping/>
+  </p:clrMapOvr>
 </p:sld>
 </file>
 

</xml_diff>